<commit_message>
Dodani screenshoti v predstavitev
</commit_message>
<xml_diff>
--- a/_PROMOCIJA/Predstavitev/Pravo za vse - predstavitev.pptx
+++ b/_PROMOCIJA/Predstavitev/Pravo za vse - predstavitev.pptx
@@ -109,6 +109,11 @@
       </a:defRPr>
     </a:lvl9pPr>
   </p:defaultTextStyle>
+  <p:extLst>
+    <p:ext uri="{EFAFB233-063F-42B5-8137-9DF3F51BA10A}">
+      <p15:sldGuideLst xmlns:p15="http://schemas.microsoft.com/office/powerpoint/2012/main"/>
+    </p:ext>
+  </p:extLst>
 </p:presentation>
 </file>
 
@@ -6445,19 +6450,19 @@
       </p:sp>
       <p:pic>
         <p:nvPicPr>
-          <p:cNvPr id="3074" name="Picture 2" descr="Email Cartoon Images - Free Download on Freepik">
+          <p:cNvPr id="6" name="Picture 5" descr="A screenshot of a computer&#10;&#10;Description automatically generated">
             <a:extLst>
               <a:ext uri="{FF2B5EF4-FFF2-40B4-BE49-F238E27FC236}">
-                <a16:creationId xmlns:a16="http://schemas.microsoft.com/office/drawing/2014/main" id="{1493799C-E9D3-4E61-A36B-793752BF3729}"/>
+                <a16:creationId xmlns:a16="http://schemas.microsoft.com/office/drawing/2014/main" id="{E559D8C1-742B-3846-82CA-9EDFF0E5F308}"/>
               </a:ext>
             </a:extLst>
           </p:cNvPr>
           <p:cNvPicPr>
-            <a:picLocks noChangeAspect="1" noChangeArrowheads="1"/>
+            <a:picLocks noChangeAspect="1"/>
           </p:cNvPicPr>
           <p:nvPr/>
         </p:nvPicPr>
-        <p:blipFill>
+        <p:blipFill rotWithShape="1">
           <a:blip r:embed="rId3">
             <a:extLst>
               <a:ext uri="{28A0092B-C50C-407E-A947-70E740481C1C}">
@@ -6465,29 +6470,52 @@
               </a:ext>
             </a:extLst>
           </a:blip>
-          <a:srcRect/>
-          <a:stretch>
-            <a:fillRect/>
-          </a:stretch>
+          <a:srcRect t="21438" r="2306" b="6906"/>
+          <a:stretch/>
         </p:blipFill>
-        <p:spPr bwMode="auto">
+        <p:spPr>
           <a:xfrm>
-            <a:off x="1364429" y="2035568"/>
-            <a:ext cx="2770746" cy="2363545"/>
+            <a:off x="152425" y="3613212"/>
+            <a:ext cx="5623481" cy="2681055"/>
           </a:xfrm>
           <a:prstGeom prst="rect">
             <a:avLst/>
           </a:prstGeom>
-          <a:noFill/>
-          <a:extLst>
-            <a:ext uri="{909E8E84-426E-40DD-AFC4-6F175D3DCCD1}">
-              <a14:hiddenFill xmlns:a14="http://schemas.microsoft.com/office/drawing/2010/main">
-                <a:solidFill>
-                  <a:srgbClr val="FFFFFF"/>
-                </a:solidFill>
-              </a14:hiddenFill>
-            </a:ext>
-          </a:extLst>
+        </p:spPr>
+      </p:pic>
+      <p:pic>
+        <p:nvPicPr>
+          <p:cNvPr id="8" name="Picture 7" descr="A screenshot of a computer&#10;&#10;Description automatically generated">
+            <a:extLst>
+              <a:ext uri="{FF2B5EF4-FFF2-40B4-BE49-F238E27FC236}">
+                <a16:creationId xmlns:a16="http://schemas.microsoft.com/office/drawing/2014/main" id="{F2DDB501-8F1B-A147-2C9C-96DD2A85AE4E}"/>
+              </a:ext>
+            </a:extLst>
+          </p:cNvPr>
+          <p:cNvPicPr>
+            <a:picLocks noChangeAspect="1"/>
+          </p:cNvPicPr>
+          <p:nvPr/>
+        </p:nvPicPr>
+        <p:blipFill rotWithShape="1">
+          <a:blip r:embed="rId4">
+            <a:extLst>
+              <a:ext uri="{28A0092B-C50C-407E-A947-70E740481C1C}">
+                <a14:useLocalDpi xmlns:a14="http://schemas.microsoft.com/office/drawing/2010/main" val="0"/>
+              </a:ext>
+            </a:extLst>
+          </a:blip>
+          <a:srcRect t="22041" r="1164" b="10766"/>
+          <a:stretch/>
+        </p:blipFill>
+        <p:spPr>
+          <a:xfrm>
+            <a:off x="152426" y="897564"/>
+            <a:ext cx="5676874" cy="2179012"/>
+          </a:xfrm>
+          <a:prstGeom prst="rect">
+            <a:avLst/>
+          </a:prstGeom>
         </p:spPr>
       </p:pic>
     </p:spTree>

</xml_diff>